<commit_message>
correction de la plupart des fautes d'orthographe
</commit_message>
<xml_diff>
--- a/Présentation/fonctionement.pptx
+++ b/Présentation/fonctionement.pptx
@@ -108,6 +108,11 @@
       </a:defRPr>
     </a:lvl9pPr>
   </p:defaultTextStyle>
+  <p:extLst>
+    <p:ext uri="{EFAFB233-063F-42B5-8137-9DF3F51BA10A}">
+      <p15:sldGuideLst xmlns:p15="http://schemas.microsoft.com/office/powerpoint/2012/main"/>
+    </p:ext>
+  </p:extLst>
 </p:presentation>
 </file>
 
@@ -3427,8 +3432,20 @@
           <a:lstStyle/>
           <a:p>
             <a:r>
+              <a:rPr lang="fr-FR" b="1" dirty="0" smtClean="0"/>
+              <a:t>Détecter </a:t>
+            </a:r>
+            <a:r>
               <a:rPr lang="fr-FR" b="1" dirty="0"/>
-              <a:t>Détectée si le personnage est sur le sol</a:t>
+              <a:t>si le personnage est </a:t>
+            </a:r>
+            <a:r>
+              <a:rPr lang="fr-FR" b="1" dirty="0" smtClean="0"/>
+              <a:t>au </a:t>
+            </a:r>
+            <a:r>
+              <a:rPr lang="fr-FR" b="1" dirty="0"/>
+              <a:t>le sol</a:t>
             </a:r>
           </a:p>
         </p:txBody>
@@ -3483,7 +3500,7 @@
         <p:spPr>
           <a:xfrm>
             <a:off x="5841242" y="1690688"/>
-            <a:ext cx="5322627" cy="369332"/>
+            <a:ext cx="5322627" cy="646331"/>
           </a:xfrm>
           <a:prstGeom prst="rect">
             <a:avLst/>
@@ -3505,17 +3522,17 @@
                 <a:effectLst/>
                 <a:latin typeface="inherit"/>
               </a:rPr>
-              <a:t>Si </a:t>
-            </a:r>
-            <a:r>
-              <a:rPr lang="fr-FR" b="0" i="0" dirty="0" err="1">
+              <a:t>Si vrai</a:t>
+            </a:r>
+            <a:r>
+              <a:rPr lang="fr-FR" b="0" i="0" dirty="0" smtClean="0">
                 <a:solidFill>
                   <a:srgbClr val="000000"/>
                 </a:solidFill>
                 <a:effectLst/>
                 <a:latin typeface="inherit"/>
               </a:rPr>
-              <a:t>vrai:Le</a:t>
+              <a:t>: Le </a:t>
             </a:r>
             <a:r>
               <a:rPr lang="fr-FR" b="0" i="0" dirty="0">
@@ -3525,7 +3542,7 @@
                 <a:effectLst/>
                 <a:latin typeface="inherit"/>
               </a:rPr>
-              <a:t> personnage est au-dessus ou en dessous </a:t>
+              <a:t>personnage est au-dessus ou en dessous </a:t>
             </a:r>
           </a:p>
         </p:txBody>
@@ -3546,9 +3563,9 @@
           <p:nvPr/>
         </p:nvCxnSpPr>
         <p:spPr>
-          <a:xfrm flipV="1">
-            <a:off x="5186148" y="1875354"/>
-            <a:ext cx="655094" cy="62628"/>
+          <a:xfrm>
+            <a:off x="5186148" y="1937982"/>
+            <a:ext cx="655094" cy="75872"/>
           </a:xfrm>
           <a:prstGeom prst="straightConnector1">
             <a:avLst/>
@@ -3588,9 +3605,9 @@
           <p:nvPr/>
         </p:nvCxnSpPr>
         <p:spPr>
-          <a:xfrm flipH="1">
-            <a:off x="8502555" y="2060020"/>
-            <a:ext cx="1" cy="560350"/>
+          <a:xfrm>
+            <a:off x="8502556" y="2337019"/>
+            <a:ext cx="0" cy="283351"/>
           </a:xfrm>
           <a:prstGeom prst="straightConnector1">
             <a:avLst/>
@@ -3651,7 +3668,27 @@
                 <a:effectLst/>
                 <a:latin typeface="inherit"/>
               </a:rPr>
-              <a:t>Si Bx&gt;Ax: le personnages est au-dessus du bloc</a:t>
+              <a:t>Si Bx&gt;Ax: le </a:t>
+            </a:r>
+            <a:r>
+              <a:rPr lang="fr-FR" b="0" i="0" dirty="0" smtClean="0">
+                <a:solidFill>
+                  <a:srgbClr val="000000"/>
+                </a:solidFill>
+                <a:effectLst/>
+                <a:latin typeface="inherit"/>
+              </a:rPr>
+              <a:t>personnage </a:t>
+            </a:r>
+            <a:r>
+              <a:rPr lang="fr-FR" b="0" i="0" dirty="0">
+                <a:solidFill>
+                  <a:srgbClr val="000000"/>
+                </a:solidFill>
+                <a:effectLst/>
+                <a:latin typeface="inherit"/>
+              </a:rPr>
+              <a:t>est au-dessus du bloc</a:t>
             </a:r>
           </a:p>
         </p:txBody>
@@ -3686,14 +3723,14 @@
           <a:p>
             <a:pPr algn="l" fontAlgn="base"/>
             <a:r>
-              <a:rPr lang="fr-FR" b="0" i="0" dirty="0" err="1">
+              <a:rPr lang="fr-FR" b="0" i="0" dirty="0" smtClean="0">
                 <a:solidFill>
                   <a:srgbClr val="000000"/>
                 </a:solidFill>
                 <a:effectLst/>
                 <a:latin typeface="inherit"/>
               </a:rPr>
-              <a:t>heigthOfPlayer</a:t>
+              <a:t>Taille joueur</a:t>
             </a:r>
             <a:endParaRPr lang="fr-FR" b="0" i="0" dirty="0">
               <a:solidFill>
@@ -3716,14 +3753,14 @@
               <a:t>Si Bx-Ax&lt;= </a:t>
             </a:r>
             <a:r>
-              <a:rPr lang="fr-FR" b="0" i="0" dirty="0" err="1">
+              <a:rPr lang="fr-FR" b="0" i="0" dirty="0" smtClean="0">
                 <a:solidFill>
                   <a:srgbClr val="000000"/>
                 </a:solidFill>
                 <a:effectLst/>
                 <a:latin typeface="inherit"/>
               </a:rPr>
-              <a:t>heigthOfPlayer</a:t>
+              <a:t>taille joueur/2</a:t>
             </a:r>
             <a:r>
               <a:rPr lang="fr-FR" b="0" i="0" dirty="0">
@@ -3733,7 +3770,7 @@
                 <a:effectLst/>
                 <a:latin typeface="inherit"/>
               </a:rPr>
-              <a:t>/2: le personnage est sur le      			sol</a:t>
+              <a:t>: le personnage est sur le      			sol</a:t>
             </a:r>
           </a:p>
         </p:txBody>
@@ -3851,6 +3888,16 @@
           <a:p>
             <a:pPr algn="l" fontAlgn="base"/>
             <a:r>
+              <a:rPr lang="fr-FR" b="0" i="0" dirty="0" smtClean="0">
+                <a:solidFill>
+                  <a:srgbClr val="000000"/>
+                </a:solidFill>
+                <a:effectLst/>
+                <a:latin typeface="inherit"/>
+              </a:rPr>
+              <a:t>Donc : Autorise </a:t>
+            </a:r>
+            <a:r>
               <a:rPr lang="fr-FR" b="0" i="0" dirty="0">
                 <a:solidFill>
                   <a:srgbClr val="000000"/>
@@ -3858,7 +3905,7 @@
                 <a:effectLst/>
                 <a:latin typeface="inherit"/>
               </a:rPr>
-              <a:t>Autorise le joueur à sauter</a:t>
+              <a:t>le joueur à sauter</a:t>
             </a:r>
           </a:p>
         </p:txBody>
@@ -3915,8 +3962,12 @@
           <a:lstStyle/>
           <a:p>
             <a:r>
+              <a:rPr lang="fr-FR" b="1" dirty="0" smtClean="0"/>
+              <a:t>Détecter </a:t>
+            </a:r>
+            <a:r>
               <a:rPr lang="fr-FR" b="1" dirty="0"/>
-              <a:t>Détectée si le personnage touche un mur</a:t>
+              <a:t>si le personnage touche un mur</a:t>
             </a:r>
           </a:p>
         </p:txBody>
@@ -4074,12 +4125,16 @@
           <a:lstStyle/>
           <a:p>
             <a:r>
-              <a:rPr lang="fr-FR" b="1" dirty="0"/>
-              <a:t>Chargée une </a:t>
-            </a:r>
-            <a:r>
-              <a:rPr lang="fr-FR" b="1" dirty="0" err="1"/>
-              <a:t>map</a:t>
+              <a:rPr lang="fr-FR" b="1" dirty="0" smtClean="0"/>
+              <a:t>Charger </a:t>
+            </a:r>
+            <a:r>
+              <a:rPr lang="fr-FR" b="1"/>
+              <a:t>une </a:t>
+            </a:r>
+            <a:r>
+              <a:rPr lang="fr-FR" b="1" smtClean="0"/>
+              <a:t>carte</a:t>
             </a:r>
             <a:endParaRPr lang="fr-FR" b="1" dirty="0"/>
           </a:p>
@@ -4144,7 +4199,23 @@
           <a:p>
             <a:r>
               <a:rPr lang="fr-FR" dirty="0"/>
-              <a:t>Des fichiers JSON contiennent une liste de nombre qui corresponde à un bloc</a:t>
+              <a:t>Des fichiers JSON contiennent une liste de </a:t>
+            </a:r>
+            <a:r>
+              <a:rPr lang="fr-FR" dirty="0" smtClean="0"/>
+              <a:t>nombres </a:t>
+            </a:r>
+            <a:r>
+              <a:rPr lang="fr-FR" dirty="0"/>
+              <a:t>qui </a:t>
+            </a:r>
+            <a:r>
+              <a:rPr lang="fr-FR" dirty="0" smtClean="0"/>
+              <a:t>correspondent </a:t>
+            </a:r>
+            <a:r>
+              <a:rPr lang="fr-FR" dirty="0"/>
+              <a:t>à un bloc</a:t>
             </a:r>
           </a:p>
         </p:txBody>
@@ -4226,8 +4297,49 @@
           <a:p>
             <a:r>
               <a:rPr lang="fr-FR" dirty="0"/>
-              <a:t>Pour les pics on cherche les blocs avec l’ID 226 ou 227(correspond aux pics)puis on ajoute des blocs avec une collision(pour pouvoir détecter quand le Player les touches)</a:t>
-            </a:r>
+              <a:t>Pour les pics </a:t>
+            </a:r>
+            <a:r>
+              <a:rPr lang="fr-FR" dirty="0" smtClean="0"/>
+              <a:t>nous</a:t>
+            </a:r>
+            <a:r>
+              <a:rPr lang="fr-FR" dirty="0" smtClean="0"/>
+              <a:t> cherchons </a:t>
+            </a:r>
+            <a:r>
+              <a:rPr lang="fr-FR" dirty="0"/>
+              <a:t>les blocs avec l’ID 226 ou </a:t>
+            </a:r>
+            <a:r>
+              <a:rPr lang="fr-FR" dirty="0" smtClean="0"/>
+              <a:t>227 (qui correspond </a:t>
+            </a:r>
+            <a:r>
+              <a:rPr lang="fr-FR" dirty="0"/>
+              <a:t>aux pics</a:t>
+            </a:r>
+            <a:r>
+              <a:rPr lang="fr-FR" dirty="0" smtClean="0"/>
+              <a:t>), puis nous ajoutons des </a:t>
+            </a:r>
+            <a:r>
+              <a:rPr lang="fr-FR" dirty="0"/>
+              <a:t>blocs avec une </a:t>
+            </a:r>
+            <a:r>
+              <a:rPr lang="fr-FR" dirty="0" smtClean="0"/>
+              <a:t>collision (</a:t>
+            </a:r>
+            <a:r>
+              <a:rPr lang="fr-FR" dirty="0"/>
+              <a:t>pour pouvoir détecter quand le Player les </a:t>
+            </a:r>
+            <a:r>
+              <a:rPr lang="fr-FR" dirty="0" smtClean="0"/>
+              <a:t>touche)</a:t>
+            </a:r>
+            <a:endParaRPr lang="fr-FR" dirty="0"/>
           </a:p>
         </p:txBody>
       </p:sp>
@@ -4319,7 +4431,55 @@
           <a:p>
             <a:r>
               <a:rPr lang="fr-FR" dirty="0"/>
-              <a:t>On ajoute un label sur les blocs qui peuvent tuer le Player lorsqu'on le touche. Puis avec un évènement on vérifie que le joueur n’est pas touché pics ou le monstre(en vérifient les labels).</a:t>
+              <a:t>On ajoute un label sur les blocs qui peuvent tuer le </a:t>
+            </a:r>
+            <a:r>
+              <a:rPr lang="fr-FR" dirty="0" smtClean="0"/>
+              <a:t>joueur </a:t>
+            </a:r>
+            <a:r>
+              <a:rPr lang="fr-FR" dirty="0"/>
+              <a:t>lorsqu'on le touche. </a:t>
+            </a:r>
+            <a:r>
+              <a:rPr lang="fr-FR" dirty="0" smtClean="0"/>
+              <a:t>ensuit </a:t>
+            </a:r>
+            <a:r>
+              <a:rPr lang="fr-FR" dirty="0"/>
+              <a:t>avec un </a:t>
+            </a:r>
+            <a:r>
+              <a:rPr lang="fr-FR" dirty="0" smtClean="0"/>
+              <a:t>événement </a:t>
+            </a:r>
+            <a:r>
+              <a:rPr lang="fr-FR" dirty="0"/>
+              <a:t>on vérifie que le joueur n’est pas touché </a:t>
+            </a:r>
+            <a:r>
+              <a:rPr lang="fr-FR" dirty="0" smtClean="0"/>
+              <a:t>par les pics </a:t>
+            </a:r>
+            <a:r>
+              <a:rPr lang="fr-FR" dirty="0"/>
+              <a:t>ou le </a:t>
+            </a:r>
+            <a:r>
+              <a:rPr lang="fr-FR" dirty="0" smtClean="0"/>
+              <a:t>monstre (</a:t>
+            </a:r>
+            <a:r>
+              <a:rPr lang="fr-FR" dirty="0"/>
+              <a:t>en </a:t>
+            </a:r>
+            <a:r>
+              <a:rPr lang="fr-FR" dirty="0" smtClean="0"/>
+              <a:t>vérifiant </a:t>
+            </a:r>
+            <a:r>
+              <a:rPr lang="fr-FR" dirty="0"/>
+              <a:t>les labels).</a:t>
             </a:r>
           </a:p>
         </p:txBody>

</xml_diff>